<commit_message>
Module 5 UserCounter, Application Variable
</commit_message>
<xml_diff>
--- a/04WebformsAdvanced.pptx
+++ b/04WebformsAdvanced.pptx
@@ -5,17 +5,18 @@
     <p:sldMasterId id="2147483684" r:id="rId1"/>
   </p:sldMasterIdLst>
   <p:notesMasterIdLst>
-    <p:notesMasterId r:id="rId10"/>
+    <p:notesMasterId r:id="rId11"/>
   </p:notesMasterIdLst>
   <p:sldIdLst>
     <p:sldId id="256" r:id="rId2"/>
     <p:sldId id="261" r:id="rId3"/>
     <p:sldId id="265" r:id="rId4"/>
     <p:sldId id="264" r:id="rId5"/>
-    <p:sldId id="263" r:id="rId6"/>
-    <p:sldId id="257" r:id="rId7"/>
-    <p:sldId id="258" r:id="rId8"/>
-    <p:sldId id="260" r:id="rId9"/>
+    <p:sldId id="266" r:id="rId6"/>
+    <p:sldId id="263" r:id="rId7"/>
+    <p:sldId id="257" r:id="rId8"/>
+    <p:sldId id="258" r:id="rId9"/>
+    <p:sldId id="260" r:id="rId10"/>
   </p:sldIdLst>
   <p:sldSz cx="12192000" cy="6858000"/>
   <p:notesSz cx="6858000" cy="9144000"/>
@@ -204,7 +205,7 @@
           <a:p>
             <a:fld id="{86035F98-A1BD-4CEA-97BE-8B0B3D35457A}" type="datetimeFigureOut">
               <a:rPr lang="de-DE" smtClean="0"/>
-              <a:t>05.06.2018</a:t>
+              <a:t>06.06.2018</a:t>
             </a:fld>
             <a:endParaRPr lang="de-DE"/>
           </a:p>
@@ -600,7 +601,7 @@
           <a:p>
             <a:fld id="{D92B96C3-1F42-476F-BF68-0478C74608EE}" type="datetimeFigureOut">
               <a:rPr lang="de-DE" smtClean="0"/>
-              <a:t>05.06.2018</a:t>
+              <a:t>06.06.2018</a:t>
             </a:fld>
             <a:endParaRPr lang="de-DE"/>
           </a:p>
@@ -768,7 +769,7 @@
           <a:p>
             <a:fld id="{D92B96C3-1F42-476F-BF68-0478C74608EE}" type="datetimeFigureOut">
               <a:rPr lang="de-DE" smtClean="0"/>
-              <a:t>05.06.2018</a:t>
+              <a:t>06.06.2018</a:t>
             </a:fld>
             <a:endParaRPr lang="de-DE"/>
           </a:p>
@@ -946,7 +947,7 @@
           <a:p>
             <a:fld id="{D92B96C3-1F42-476F-BF68-0478C74608EE}" type="datetimeFigureOut">
               <a:rPr lang="de-DE" smtClean="0"/>
-              <a:t>05.06.2018</a:t>
+              <a:t>06.06.2018</a:t>
             </a:fld>
             <a:endParaRPr lang="de-DE"/>
           </a:p>
@@ -1114,7 +1115,7 @@
           <a:p>
             <a:fld id="{D92B96C3-1F42-476F-BF68-0478C74608EE}" type="datetimeFigureOut">
               <a:rPr lang="de-DE" smtClean="0"/>
-              <a:t>05.06.2018</a:t>
+              <a:t>06.06.2018</a:t>
             </a:fld>
             <a:endParaRPr lang="de-DE"/>
           </a:p>
@@ -1359,7 +1360,7 @@
           <a:p>
             <a:fld id="{D92B96C3-1F42-476F-BF68-0478C74608EE}" type="datetimeFigureOut">
               <a:rPr lang="de-DE" smtClean="0"/>
-              <a:t>05.06.2018</a:t>
+              <a:t>06.06.2018</a:t>
             </a:fld>
             <a:endParaRPr lang="de-DE"/>
           </a:p>
@@ -1588,7 +1589,7 @@
           <a:p>
             <a:fld id="{D92B96C3-1F42-476F-BF68-0478C74608EE}" type="datetimeFigureOut">
               <a:rPr lang="de-DE" smtClean="0"/>
-              <a:t>05.06.2018</a:t>
+              <a:t>06.06.2018</a:t>
             </a:fld>
             <a:endParaRPr lang="de-DE"/>
           </a:p>
@@ -1952,7 +1953,7 @@
           <a:p>
             <a:fld id="{D92B96C3-1F42-476F-BF68-0478C74608EE}" type="datetimeFigureOut">
               <a:rPr lang="de-DE" smtClean="0"/>
-              <a:t>05.06.2018</a:t>
+              <a:t>06.06.2018</a:t>
             </a:fld>
             <a:endParaRPr lang="de-DE"/>
           </a:p>
@@ -2069,7 +2070,7 @@
           <a:p>
             <a:fld id="{D92B96C3-1F42-476F-BF68-0478C74608EE}" type="datetimeFigureOut">
               <a:rPr lang="de-DE" smtClean="0"/>
-              <a:t>05.06.2018</a:t>
+              <a:t>06.06.2018</a:t>
             </a:fld>
             <a:endParaRPr lang="de-DE"/>
           </a:p>
@@ -2164,7 +2165,7 @@
           <a:p>
             <a:fld id="{D92B96C3-1F42-476F-BF68-0478C74608EE}" type="datetimeFigureOut">
               <a:rPr lang="de-DE" smtClean="0"/>
-              <a:t>05.06.2018</a:t>
+              <a:t>06.06.2018</a:t>
             </a:fld>
             <a:endParaRPr lang="de-DE"/>
           </a:p>
@@ -2439,7 +2440,7 @@
           <a:p>
             <a:fld id="{D92B96C3-1F42-476F-BF68-0478C74608EE}" type="datetimeFigureOut">
               <a:rPr lang="de-DE" smtClean="0"/>
-              <a:t>05.06.2018</a:t>
+              <a:t>06.06.2018</a:t>
             </a:fld>
             <a:endParaRPr lang="de-DE"/>
           </a:p>
@@ -2691,7 +2692,7 @@
           <a:p>
             <a:fld id="{D92B96C3-1F42-476F-BF68-0478C74608EE}" type="datetimeFigureOut">
               <a:rPr lang="de-DE" smtClean="0"/>
-              <a:t>05.06.2018</a:t>
+              <a:t>06.06.2018</a:t>
             </a:fld>
             <a:endParaRPr lang="de-DE"/>
           </a:p>
@@ -2902,7 +2903,7 @@
           <a:p>
             <a:fld id="{D92B96C3-1F42-476F-BF68-0478C74608EE}" type="datetimeFigureOut">
               <a:rPr lang="de-DE" smtClean="0"/>
-              <a:t>05.06.2018</a:t>
+              <a:t>06.06.2018</a:t>
             </a:fld>
             <a:endParaRPr lang="de-DE"/>
           </a:p>
@@ -3473,8 +3474,8 @@
           <a:lstStyle/>
           <a:p>
             <a:r>
-              <a:rPr lang="de-DE" dirty="0" err="1" smtClean="0"/>
-              <a:t>Postback</a:t>
+              <a:rPr lang="de-DE" dirty="0" smtClean="0"/>
+              <a:t>Dropdown im Detail</a:t>
             </a:r>
             <a:endParaRPr lang="de-DE" dirty="0"/>
           </a:p>
@@ -3497,7 +3498,39 @@
           <a:p>
             <a:r>
               <a:rPr lang="de-DE" dirty="0" smtClean="0"/>
-              <a:t>Dropdownliste</a:t>
+              <a:t>Dropdownlist Steuerelement</a:t>
+            </a:r>
+          </a:p>
+          <a:p>
+            <a:pPr lvl="1"/>
+            <a:r>
+              <a:rPr lang="de-DE" dirty="0" smtClean="0"/>
+              <a:t>UI Designer</a:t>
+            </a:r>
+          </a:p>
+          <a:p>
+            <a:pPr lvl="1"/>
+            <a:r>
+              <a:rPr lang="de-DE" dirty="0" smtClean="0"/>
+              <a:t>Datenquelle</a:t>
+            </a:r>
+          </a:p>
+          <a:p>
+            <a:pPr lvl="1"/>
+            <a:r>
+              <a:rPr lang="de-DE" dirty="0" smtClean="0"/>
+              <a:t>Manuelle Listitems in ASPX</a:t>
+            </a:r>
+          </a:p>
+          <a:p>
+            <a:pPr lvl="1"/>
+            <a:r>
+              <a:rPr lang="de-DE" dirty="0" smtClean="0"/>
+              <a:t>Per </a:t>
+            </a:r>
+            <a:r>
+              <a:rPr lang="de-DE" smtClean="0"/>
+              <a:t>Code Add</a:t>
             </a:r>
           </a:p>
           <a:p>
@@ -3508,8 +3541,36 @@
             </a:r>
             <a:endParaRPr lang="de-DE" dirty="0"/>
           </a:p>
-        </p:txBody>
-      </p:sp>
+          <a:p>
+            <a:pPr lvl="1"/>
+            <a:endParaRPr lang="de-DE" dirty="0"/>
+          </a:p>
+        </p:txBody>
+      </p:sp>
+      <p:pic>
+        <p:nvPicPr>
+          <p:cNvPr id="4" name="Grafik 3"/>
+          <p:cNvPicPr>
+            <a:picLocks noChangeAspect="1"/>
+          </p:cNvPicPr>
+          <p:nvPr/>
+        </p:nvPicPr>
+        <p:blipFill>
+          <a:blip r:embed="rId2"/>
+          <a:stretch>
+            <a:fillRect/>
+          </a:stretch>
+        </p:blipFill>
+        <p:spPr>
+          <a:xfrm>
+            <a:off x="8787403" y="814388"/>
+            <a:ext cx="2676525" cy="1752600"/>
+          </a:xfrm>
+          <a:prstGeom prst="rect">
+            <a:avLst/>
+          </a:prstGeom>
+        </p:spPr>
+      </p:pic>
     </p:spTree>
     <p:extLst>
       <p:ext uri="{BB962C8B-B14F-4D97-AF65-F5344CB8AC3E}">
@@ -3936,16 +3997,12 @@
           <a:lstStyle/>
           <a:p>
             <a:r>
+              <a:rPr lang="de-DE" dirty="0" err="1" smtClean="0"/>
+              <a:t>ToDo</a:t>
+            </a:r>
+            <a:r>
               <a:rPr lang="de-DE" dirty="0" smtClean="0"/>
-              <a:t>Control </a:t>
-            </a:r>
-            <a:r>
-              <a:rPr lang="de-DE" dirty="0" err="1" smtClean="0"/>
-              <a:t>Tree</a:t>
-            </a:r>
-            <a:r>
-              <a:rPr lang="de-DE" dirty="0" smtClean="0"/>
-              <a:t>	</a:t>
+              <a:t> List Lab</a:t>
             </a:r>
             <a:endParaRPr lang="de-DE" dirty="0"/>
           </a:p>
@@ -3966,148 +4023,14 @@
           <a:bodyPr/>
           <a:lstStyle/>
           <a:p>
-            <a:r>
-              <a:rPr lang="de-DE" dirty="0" smtClean="0"/>
-              <a:t>Controls sind hierarchisch</a:t>
-            </a:r>
-          </a:p>
-          <a:p>
-            <a:r>
-              <a:rPr lang="de-DE" dirty="0" smtClean="0"/>
-              <a:t>Diese können auch per Code erzeugt werden</a:t>
-            </a:r>
-            <a:endParaRPr lang="de-DE" dirty="0"/>
-          </a:p>
-        </p:txBody>
-      </p:sp>
-      <p:sp>
-        <p:nvSpPr>
-          <p:cNvPr id="4" name="Rechteck 3"/>
-          <p:cNvSpPr/>
-          <p:nvPr/>
-        </p:nvSpPr>
-        <p:spPr>
-          <a:xfrm>
-            <a:off x="3047999" y="2963917"/>
-            <a:ext cx="6316717" cy="1477328"/>
-          </a:xfrm>
-          <a:prstGeom prst="rect">
-            <a:avLst/>
-          </a:prstGeom>
-        </p:spPr>
-        <p:txBody>
-          <a:bodyPr wrap="square">
-            <a:spAutoFit/>
-          </a:bodyPr>
-          <a:lstStyle/>
-          <a:p>
-            <a:r>
-              <a:rPr lang="de-DE" dirty="0"/>
-              <a:t>Button </a:t>
-            </a:r>
-            <a:r>
-              <a:rPr lang="de-DE" dirty="0" err="1"/>
-              <a:t>btnSubmit</a:t>
-            </a:r>
-            <a:r>
-              <a:rPr lang="de-DE" dirty="0"/>
-              <a:t> = </a:t>
-            </a:r>
-            <a:r>
-              <a:rPr lang="de-DE" dirty="0" err="1"/>
-              <a:t>new</a:t>
-            </a:r>
-            <a:r>
-              <a:rPr lang="de-DE" dirty="0"/>
-              <a:t> Button();</a:t>
-            </a:r>
-          </a:p>
-          <a:p>
-            <a:r>
-              <a:rPr lang="de-DE" dirty="0"/>
-              <a:t>btnSubmit.ID = "</a:t>
-            </a:r>
-            <a:r>
-              <a:rPr lang="de-DE" dirty="0" err="1"/>
-              <a:t>btnSubmit</a:t>
-            </a:r>
-            <a:r>
-              <a:rPr lang="de-DE" dirty="0"/>
-              <a:t>";</a:t>
-            </a:r>
-          </a:p>
-          <a:p>
-            <a:r>
-              <a:rPr lang="de-DE" dirty="0" err="1"/>
-              <a:t>btnSubmit.Text</a:t>
-            </a:r>
-            <a:r>
-              <a:rPr lang="de-DE" dirty="0"/>
-              <a:t> = "</a:t>
-            </a:r>
-            <a:r>
-              <a:rPr lang="de-DE" dirty="0" err="1"/>
-              <a:t>Submit</a:t>
-            </a:r>
-            <a:r>
-              <a:rPr lang="de-DE" dirty="0"/>
-              <a:t>";</a:t>
-            </a:r>
-          </a:p>
-          <a:p>
-            <a:r>
-              <a:rPr lang="de-DE" dirty="0" err="1"/>
-              <a:t>btnSubmit.Click</a:t>
-            </a:r>
-            <a:r>
-              <a:rPr lang="de-DE" dirty="0"/>
-              <a:t> += </a:t>
-            </a:r>
-            <a:r>
-              <a:rPr lang="de-DE" dirty="0" err="1"/>
-              <a:t>new</a:t>
-            </a:r>
-            <a:r>
-              <a:rPr lang="de-DE" dirty="0"/>
-              <a:t> </a:t>
-            </a:r>
-            <a:r>
-              <a:rPr lang="de-DE" dirty="0" err="1"/>
-              <a:t>System.EventHandler</a:t>
-            </a:r>
-            <a:r>
-              <a:rPr lang="de-DE" dirty="0"/>
-              <a:t>(</a:t>
-            </a:r>
-            <a:r>
-              <a:rPr lang="de-DE" dirty="0" err="1"/>
-              <a:t>btnSubmit_Click</a:t>
-            </a:r>
-            <a:r>
-              <a:rPr lang="de-DE" dirty="0"/>
-              <a:t>);</a:t>
-            </a:r>
-          </a:p>
-          <a:p>
-            <a:r>
-              <a:rPr lang="de-DE" dirty="0"/>
-              <a:t>this.form1.Controls.Add(</a:t>
-            </a:r>
-            <a:r>
-              <a:rPr lang="de-DE" dirty="0" err="1"/>
-              <a:t>btnSubmit</a:t>
-            </a:r>
-            <a:r>
-              <a:rPr lang="de-DE"/>
-              <a:t>);</a:t>
-            </a:r>
+            <a:endParaRPr lang="de-DE"/>
           </a:p>
         </p:txBody>
       </p:sp>
     </p:spTree>
     <p:extLst>
       <p:ext uri="{BB962C8B-B14F-4D97-AF65-F5344CB8AC3E}">
-        <p14:creationId xmlns:p14="http://schemas.microsoft.com/office/powerpoint/2010/main" val="3924214914"/>
+        <p14:creationId xmlns:p14="http://schemas.microsoft.com/office/powerpoint/2010/main" val="4172484600"/>
       </p:ext>
     </p:extLst>
   </p:cSld>
@@ -4157,8 +4080,16 @@
           <a:lstStyle/>
           <a:p>
             <a:r>
+              <a:rPr lang="de-DE" dirty="0" smtClean="0"/>
+              <a:t>Control </a:t>
+            </a:r>
+            <a:r>
               <a:rPr lang="de-DE" dirty="0" err="1" smtClean="0"/>
-              <a:t>FileUpload</a:t>
+              <a:t>Tree</a:t>
+            </a:r>
+            <a:r>
+              <a:rPr lang="de-DE" dirty="0" smtClean="0"/>
+              <a:t>	</a:t>
             </a:r>
             <a:endParaRPr lang="de-DE" dirty="0"/>
           </a:p>
@@ -4180,46 +4111,147 @@
           <a:lstStyle/>
           <a:p>
             <a:r>
-              <a:rPr lang="de-DE" dirty="0" err="1" smtClean="0"/>
-              <a:t>FileUpload</a:t>
-            </a:r>
-            <a:r>
               <a:rPr lang="de-DE" dirty="0" smtClean="0"/>
-              <a:t> Control</a:t>
+              <a:t>Controls sind hierarchisch</a:t>
             </a:r>
           </a:p>
           <a:p>
             <a:r>
               <a:rPr lang="de-DE" dirty="0" smtClean="0"/>
-              <a:t>Button Click</a:t>
-            </a:r>
-          </a:p>
-          <a:p>
-            <a:pPr lvl="1"/>
-            <a:r>
-              <a:rPr lang="de-DE" dirty="0" err="1" smtClean="0"/>
-              <a:t>Hasfile</a:t>
-            </a:r>
-            <a:endParaRPr lang="de-DE" dirty="0" smtClean="0"/>
-          </a:p>
-          <a:p>
-            <a:pPr lvl="1"/>
-            <a:r>
-              <a:rPr lang="de-DE" dirty="0" err="1" smtClean="0"/>
-              <a:t>SaveAs</a:t>
-            </a:r>
-            <a:endParaRPr lang="de-DE" dirty="0" smtClean="0"/>
-          </a:p>
-          <a:p>
-            <a:pPr lvl="1"/>
+              <a:t>Diese können auch per Code erzeugt werden</a:t>
+            </a:r>
             <a:endParaRPr lang="de-DE" dirty="0"/>
+          </a:p>
+        </p:txBody>
+      </p:sp>
+      <p:sp>
+        <p:nvSpPr>
+          <p:cNvPr id="4" name="Rechteck 3"/>
+          <p:cNvSpPr/>
+          <p:nvPr/>
+        </p:nvSpPr>
+        <p:spPr>
+          <a:xfrm>
+            <a:off x="3047999" y="2963917"/>
+            <a:ext cx="6316717" cy="1477328"/>
+          </a:xfrm>
+          <a:prstGeom prst="rect">
+            <a:avLst/>
+          </a:prstGeom>
+        </p:spPr>
+        <p:txBody>
+          <a:bodyPr wrap="square">
+            <a:spAutoFit/>
+          </a:bodyPr>
+          <a:lstStyle/>
+          <a:p>
+            <a:r>
+              <a:rPr lang="de-DE" dirty="0"/>
+              <a:t>Button </a:t>
+            </a:r>
+            <a:r>
+              <a:rPr lang="de-DE" dirty="0" err="1"/>
+              <a:t>btnSubmit</a:t>
+            </a:r>
+            <a:r>
+              <a:rPr lang="de-DE" dirty="0"/>
+              <a:t> = </a:t>
+            </a:r>
+            <a:r>
+              <a:rPr lang="de-DE" dirty="0" err="1"/>
+              <a:t>new</a:t>
+            </a:r>
+            <a:r>
+              <a:rPr lang="de-DE" dirty="0"/>
+              <a:t> Button();</a:t>
+            </a:r>
+          </a:p>
+          <a:p>
+            <a:r>
+              <a:rPr lang="de-DE" dirty="0"/>
+              <a:t>btnSubmit.ID = "</a:t>
+            </a:r>
+            <a:r>
+              <a:rPr lang="de-DE" dirty="0" err="1"/>
+              <a:t>btnSubmit</a:t>
+            </a:r>
+            <a:r>
+              <a:rPr lang="de-DE" dirty="0"/>
+              <a:t>";</a:t>
+            </a:r>
+          </a:p>
+          <a:p>
+            <a:r>
+              <a:rPr lang="de-DE" dirty="0" err="1"/>
+              <a:t>btnSubmit.Text</a:t>
+            </a:r>
+            <a:r>
+              <a:rPr lang="de-DE" dirty="0"/>
+              <a:t> = "</a:t>
+            </a:r>
+            <a:r>
+              <a:rPr lang="de-DE" dirty="0" err="1"/>
+              <a:t>Submit</a:t>
+            </a:r>
+            <a:r>
+              <a:rPr lang="de-DE" dirty="0"/>
+              <a:t>";</a:t>
+            </a:r>
+          </a:p>
+          <a:p>
+            <a:r>
+              <a:rPr lang="de-DE" dirty="0" err="1"/>
+              <a:t>btnSubmit.Click</a:t>
+            </a:r>
+            <a:r>
+              <a:rPr lang="de-DE" dirty="0"/>
+              <a:t> += </a:t>
+            </a:r>
+            <a:r>
+              <a:rPr lang="de-DE" dirty="0" err="1"/>
+              <a:t>new</a:t>
+            </a:r>
+            <a:r>
+              <a:rPr lang="de-DE" dirty="0"/>
+              <a:t> </a:t>
+            </a:r>
+            <a:r>
+              <a:rPr lang="de-DE" dirty="0" err="1"/>
+              <a:t>System.EventHandler</a:t>
+            </a:r>
+            <a:r>
+              <a:rPr lang="de-DE" dirty="0"/>
+              <a:t>(</a:t>
+            </a:r>
+            <a:r>
+              <a:rPr lang="de-DE" dirty="0" err="1"/>
+              <a:t>btnSubmit_Click</a:t>
+            </a:r>
+            <a:r>
+              <a:rPr lang="de-DE" dirty="0"/>
+              <a:t>);</a:t>
+            </a:r>
+          </a:p>
+          <a:p>
+            <a:r>
+              <a:rPr lang="de-DE" dirty="0"/>
+              <a:t>this.form1.Controls.Add(</a:t>
+            </a:r>
+            <a:r>
+              <a:rPr lang="de-DE" dirty="0" err="1"/>
+              <a:t>btnSubmit</a:t>
+            </a:r>
+            <a:r>
+              <a:rPr lang="de-DE"/>
+              <a:t>);</a:t>
+            </a:r>
           </a:p>
         </p:txBody>
       </p:sp>
     </p:spTree>
     <p:extLst>
       <p:ext uri="{BB962C8B-B14F-4D97-AF65-F5344CB8AC3E}">
-        <p14:creationId xmlns:p14="http://schemas.microsoft.com/office/powerpoint/2010/main" val="1583607295"/>
+        <p14:creationId xmlns:p14="http://schemas.microsoft.com/office/powerpoint/2010/main" val="3924214914"/>
       </p:ext>
     </p:extLst>
   </p:cSld>
@@ -4269,6 +4301,118 @@
           <a:lstStyle/>
           <a:p>
             <a:r>
+              <a:rPr lang="de-DE" dirty="0" err="1" smtClean="0"/>
+              <a:t>FileUpload</a:t>
+            </a:r>
+            <a:endParaRPr lang="de-DE" dirty="0"/>
+          </a:p>
+        </p:txBody>
+      </p:sp>
+      <p:sp>
+        <p:nvSpPr>
+          <p:cNvPr id="3" name="Inhaltsplatzhalter 2"/>
+          <p:cNvSpPr>
+            <a:spLocks noGrp="1"/>
+          </p:cNvSpPr>
+          <p:nvPr>
+            <p:ph idx="1"/>
+          </p:nvPr>
+        </p:nvSpPr>
+        <p:spPr/>
+        <p:txBody>
+          <a:bodyPr/>
+          <a:lstStyle/>
+          <a:p>
+            <a:r>
+              <a:rPr lang="de-DE" dirty="0" err="1" smtClean="0"/>
+              <a:t>FileUpload</a:t>
+            </a:r>
+            <a:r>
+              <a:rPr lang="de-DE" dirty="0" smtClean="0"/>
+              <a:t> Control</a:t>
+            </a:r>
+          </a:p>
+          <a:p>
+            <a:r>
+              <a:rPr lang="de-DE" dirty="0" smtClean="0"/>
+              <a:t>Button Click</a:t>
+            </a:r>
+          </a:p>
+          <a:p>
+            <a:pPr lvl="1"/>
+            <a:r>
+              <a:rPr lang="de-DE" dirty="0" err="1" smtClean="0"/>
+              <a:t>Hasfile</a:t>
+            </a:r>
+            <a:endParaRPr lang="de-DE" dirty="0" smtClean="0"/>
+          </a:p>
+          <a:p>
+            <a:pPr lvl="1"/>
+            <a:r>
+              <a:rPr lang="de-DE" dirty="0" err="1" smtClean="0"/>
+              <a:t>SaveAs</a:t>
+            </a:r>
+            <a:endParaRPr lang="de-DE" dirty="0" smtClean="0"/>
+          </a:p>
+          <a:p>
+            <a:pPr lvl="1"/>
+            <a:endParaRPr lang="de-DE" dirty="0"/>
+          </a:p>
+        </p:txBody>
+      </p:sp>
+    </p:spTree>
+    <p:extLst>
+      <p:ext uri="{BB962C8B-B14F-4D97-AF65-F5344CB8AC3E}">
+        <p14:creationId xmlns:p14="http://schemas.microsoft.com/office/powerpoint/2010/main" val="1583607295"/>
+      </p:ext>
+    </p:extLst>
+  </p:cSld>
+  <p:clrMapOvr>
+    <a:masterClrMapping/>
+  </p:clrMapOvr>
+  <p:timing>
+    <p:tnLst>
+      <p:par>
+        <p:cTn id="1" dur="indefinite" restart="never" nodeType="tmRoot"/>
+      </p:par>
+    </p:tnLst>
+  </p:timing>
+</p:sld>
+</file>
+
+<file path=ppt/slides/slide8.xml><?xml version="1.0" encoding="utf-8"?>
+<p:sld xmlns:a="http://schemas.openxmlformats.org/drawingml/2006/main" xmlns:r="http://schemas.openxmlformats.org/officeDocument/2006/relationships" xmlns:p="http://schemas.openxmlformats.org/presentationml/2006/main">
+  <p:cSld>
+    <p:spTree>
+      <p:nvGrpSpPr>
+        <p:cNvPr id="1" name=""/>
+        <p:cNvGrpSpPr/>
+        <p:nvPr/>
+      </p:nvGrpSpPr>
+      <p:grpSpPr>
+        <a:xfrm>
+          <a:off x="0" y="0"/>
+          <a:ext cx="0" cy="0"/>
+          <a:chOff x="0" y="0"/>
+          <a:chExt cx="0" cy="0"/>
+        </a:xfrm>
+      </p:grpSpPr>
+      <p:sp>
+        <p:nvSpPr>
+          <p:cNvPr id="2" name="Titel 1"/>
+          <p:cNvSpPr>
+            <a:spLocks noGrp="1"/>
+          </p:cNvSpPr>
+          <p:nvPr>
+            <p:ph type="title"/>
+          </p:nvPr>
+        </p:nvSpPr>
+        <p:spPr/>
+        <p:txBody>
+          <a:bodyPr/>
+          <a:lstStyle/>
+          <a:p>
+            <a:r>
               <a:rPr lang="de-DE" dirty="0" smtClean="0"/>
               <a:t>Sendmail</a:t>
             </a:r>
@@ -4358,7 +4502,7 @@
 </p:sld>
 </file>
 
-<file path=ppt/slides/slide8.xml><?xml version="1.0" encoding="utf-8"?>
+<file path=ppt/slides/slide9.xml><?xml version="1.0" encoding="utf-8"?>
 <p:sld xmlns:a="http://schemas.openxmlformats.org/drawingml/2006/main" xmlns:r="http://schemas.openxmlformats.org/officeDocument/2006/relationships" xmlns:p="http://schemas.openxmlformats.org/presentationml/2006/main">
   <p:cSld>
     <p:spTree>

</xml_diff>